<commit_message>
Added gitignore hint, changed order of steps in pp
</commit_message>
<xml_diff>
--- a/Tutorial/Thema1_Tutorial_Einfuehrung.pptx
+++ b/Tutorial/Thema1_Tutorial_Einfuehrung.pptx
@@ -234,7 +234,7 @@
           <a:p>
             <a:fld id="{0AE13250-C537-B448-BED9-AF61DCF088B2}" type="datetimeFigureOut">
               <a:rPr lang="de-DE" smtClean="0"/>
-              <a:t>14.11.2018</a:t>
+              <a:t>15.11.2018</a:t>
             </a:fld>
             <a:endParaRPr lang="de-DE"/>
           </a:p>
@@ -400,7 +400,7 @@
           <a:p>
             <a:fld id="{7BF8C751-7494-BF40-8574-213D7890D13D}" type="datetimeFigureOut">
               <a:rPr lang="de-DE" smtClean="0"/>
-              <a:t>14.11.2018</a:t>
+              <a:t>15.11.2018</a:t>
             </a:fld>
             <a:endParaRPr lang="de-DE"/>
           </a:p>
@@ -15477,7 +15477,15 @@
             </a:pPr>
             <a:r>
               <a:rPr lang="de-DE" sz="1600" dirty="0"/>
-              <a:t>JUNIT Tests</a:t>
+              <a:t>Änderungen in </a:t>
+            </a:r>
+            <a:r>
+              <a:rPr lang="de-DE" sz="1600" dirty="0" err="1"/>
+              <a:t>git</a:t>
+            </a:r>
+            <a:r>
+              <a:rPr lang="de-DE" sz="1600"/>
+              <a:t> pushen</a:t>
             </a:r>
           </a:p>
           <a:p>
@@ -15486,16 +15494,12 @@
               <a:buAutoNum type="arabicPeriod"/>
             </a:pPr>
             <a:r>
+              <a:rPr lang="de-DE" sz="1600"/>
+              <a:t>JUNIT </a:t>
+            </a:r>
+            <a:r>
               <a:rPr lang="de-DE" sz="1600" dirty="0"/>
-              <a:t>Änderungen in </a:t>
-            </a:r>
-            <a:r>
-              <a:rPr lang="de-DE" sz="1600" dirty="0" err="1"/>
-              <a:t>git</a:t>
-            </a:r>
-            <a:r>
-              <a:rPr lang="de-DE" sz="1600" dirty="0"/>
-              <a:t> pushen</a:t>
+              <a:t>Tests</a:t>
             </a:r>
           </a:p>
           <a:p>

</xml_diff>